<commit_message>
Update powerpoint presentation with Dan's stuff
</commit_message>
<xml_diff>
--- a/winter_prog/Winter_Progress_Report.pptx
+++ b/winter_prog/Winter_Progress_Report.pptx
@@ -5,7 +5,7 @@
     <p:sldMasterId id="2147484088" r:id="rId1"/>
   </p:sldMasterIdLst>
   <p:notesMasterIdLst>
-    <p:notesMasterId r:id="rId13"/>
+    <p:notesMasterId r:id="rId17"/>
   </p:notesMasterIdLst>
   <p:sldIdLst>
     <p:sldId id="264" r:id="rId2"/>
@@ -18,7 +18,11 @@
     <p:sldId id="277" r:id="rId9"/>
     <p:sldId id="278" r:id="rId10"/>
     <p:sldId id="273" r:id="rId11"/>
-    <p:sldId id="274" r:id="rId12"/>
+    <p:sldId id="279" r:id="rId12"/>
+    <p:sldId id="280" r:id="rId13"/>
+    <p:sldId id="281" r:id="rId14"/>
+    <p:sldId id="282" r:id="rId15"/>
+    <p:sldId id="274" r:id="rId16"/>
   </p:sldIdLst>
   <p:sldSz cx="12192000" cy="6858000"/>
   <p:notesSz cx="6858000" cy="9144000"/>
@@ -132,6 +136,10 @@
             <p14:sldId id="277"/>
             <p14:sldId id="278"/>
             <p14:sldId id="273"/>
+            <p14:sldId id="279"/>
+            <p14:sldId id="280"/>
+            <p14:sldId id="281"/>
+            <p14:sldId id="282"/>
             <p14:sldId id="274"/>
           </p14:sldIdLst>
         </p14:section>
@@ -226,7 +234,7 @@
           <a:p>
             <a:fld id="{F8D593E4-1201-480B-80CE-C324740B0365}" type="datetimeFigureOut">
               <a:rPr lang="en-US" smtClean="0"/>
-              <a:t>2/16/2017</a:t>
+              <a:t>2/17/2017</a:t>
             </a:fld>
             <a:endParaRPr lang="en-US"/>
           </a:p>
@@ -994,7 +1002,7 @@
           <a:p>
             <a:fld id="{545C1171-4E79-4D59-8F00-AAF31F85EA49}" type="datetimeFigureOut">
               <a:rPr lang="en-US" smtClean="0"/>
-              <a:t>2/16/2017</a:t>
+              <a:t>2/17/2017</a:t>
             </a:fld>
             <a:endParaRPr lang="en-US"/>
           </a:p>
@@ -1318,7 +1326,7 @@
           <a:p>
             <a:fld id="{545C1171-4E79-4D59-8F00-AAF31F85EA49}" type="datetimeFigureOut">
               <a:rPr lang="en-US" smtClean="0"/>
-              <a:t>2/16/2017</a:t>
+              <a:t>2/17/2017</a:t>
             </a:fld>
             <a:endParaRPr lang="en-US"/>
           </a:p>
@@ -1566,7 +1574,7 @@
           <a:p>
             <a:fld id="{545C1171-4E79-4D59-8F00-AAF31F85EA49}" type="datetimeFigureOut">
               <a:rPr lang="en-US" smtClean="0"/>
-              <a:t>2/16/2017</a:t>
+              <a:t>2/17/2017</a:t>
             </a:fld>
             <a:endParaRPr lang="en-US"/>
           </a:p>
@@ -1905,7 +1913,7 @@
           <a:p>
             <a:fld id="{545C1171-4E79-4D59-8F00-AAF31F85EA49}" type="datetimeFigureOut">
               <a:rPr lang="en-US" smtClean="0"/>
-              <a:t>2/16/2017</a:t>
+              <a:t>2/17/2017</a:t>
             </a:fld>
             <a:endParaRPr lang="en-US"/>
           </a:p>
@@ -2252,7 +2260,7 @@
           <a:p>
             <a:fld id="{545C1171-4E79-4D59-8F00-AAF31F85EA49}" type="datetimeFigureOut">
               <a:rPr lang="en-US" smtClean="0"/>
-              <a:t>2/16/2017</a:t>
+              <a:t>2/17/2017</a:t>
             </a:fld>
             <a:endParaRPr lang="en-US"/>
           </a:p>
@@ -2626,7 +2634,7 @@
           <a:p>
             <a:fld id="{545C1171-4E79-4D59-8F00-AAF31F85EA49}" type="datetimeFigureOut">
               <a:rPr lang="en-US" smtClean="0"/>
-              <a:t>2/16/2017</a:t>
+              <a:t>2/17/2017</a:t>
             </a:fld>
             <a:endParaRPr lang="en-US"/>
           </a:p>
@@ -3096,7 +3104,7 @@
           <a:p>
             <a:fld id="{545C1171-4E79-4D59-8F00-AAF31F85EA49}" type="datetimeFigureOut">
               <a:rPr lang="en-US" smtClean="0"/>
-              <a:t>2/16/2017</a:t>
+              <a:t>2/17/2017</a:t>
             </a:fld>
             <a:endParaRPr lang="en-US"/>
           </a:p>
@@ -3301,7 +3309,7 @@
           <a:p>
             <a:fld id="{545C1171-4E79-4D59-8F00-AAF31F85EA49}" type="datetimeFigureOut">
               <a:rPr lang="en-US" smtClean="0"/>
-              <a:t>2/16/2017</a:t>
+              <a:t>2/17/2017</a:t>
             </a:fld>
             <a:endParaRPr lang="en-US"/>
           </a:p>
@@ -3512,7 +3520,7 @@
           <a:p>
             <a:fld id="{545C1171-4E79-4D59-8F00-AAF31F85EA49}" type="datetimeFigureOut">
               <a:rPr lang="en-US" smtClean="0"/>
-              <a:t>2/16/2017</a:t>
+              <a:t>2/17/2017</a:t>
             </a:fld>
             <a:endParaRPr lang="en-US"/>
           </a:p>
@@ -3743,7 +3751,7 @@
           <a:p>
             <a:fld id="{545C1171-4E79-4D59-8F00-AAF31F85EA49}" type="datetimeFigureOut">
               <a:rPr lang="en-US" smtClean="0"/>
-              <a:t>2/16/2017</a:t>
+              <a:t>2/17/2017</a:t>
             </a:fld>
             <a:endParaRPr lang="en-US"/>
           </a:p>
@@ -3991,7 +3999,7 @@
           <a:p>
             <a:fld id="{545C1171-4E79-4D59-8F00-AAF31F85EA49}" type="datetimeFigureOut">
               <a:rPr lang="en-US" smtClean="0"/>
-              <a:t>2/16/2017</a:t>
+              <a:t>2/17/2017</a:t>
             </a:fld>
             <a:endParaRPr lang="en-US"/>
           </a:p>
@@ -4289,7 +4297,7 @@
           <a:p>
             <a:fld id="{545C1171-4E79-4D59-8F00-AAF31F85EA49}" type="datetimeFigureOut">
               <a:rPr lang="en-US" smtClean="0"/>
-              <a:t>2/16/2017</a:t>
+              <a:t>2/17/2017</a:t>
             </a:fld>
             <a:endParaRPr lang="en-US"/>
           </a:p>
@@ -4671,7 +4679,7 @@
           <a:p>
             <a:fld id="{545C1171-4E79-4D59-8F00-AAF31F85EA49}" type="datetimeFigureOut">
               <a:rPr lang="en-US" smtClean="0"/>
-              <a:t>2/16/2017</a:t>
+              <a:t>2/17/2017</a:t>
             </a:fld>
             <a:endParaRPr lang="en-US"/>
           </a:p>
@@ -4820,7 +4828,7 @@
           <a:p>
             <a:fld id="{545C1171-4E79-4D59-8F00-AAF31F85EA49}" type="datetimeFigureOut">
               <a:rPr lang="en-US" smtClean="0"/>
-              <a:t>2/16/2017</a:t>
+              <a:t>2/17/2017</a:t>
             </a:fld>
             <a:endParaRPr lang="en-US"/>
           </a:p>
@@ -4946,7 +4954,7 @@
           <a:p>
             <a:fld id="{545C1171-4E79-4D59-8F00-AAF31F85EA49}" type="datetimeFigureOut">
               <a:rPr lang="en-US" smtClean="0"/>
-              <a:t>2/16/2017</a:t>
+              <a:t>2/17/2017</a:t>
             </a:fld>
             <a:endParaRPr lang="en-US"/>
           </a:p>
@@ -5201,7 +5209,7 @@
           <a:p>
             <a:fld id="{545C1171-4E79-4D59-8F00-AAF31F85EA49}" type="datetimeFigureOut">
               <a:rPr lang="en-US" smtClean="0"/>
-              <a:t>2/16/2017</a:t>
+              <a:t>2/17/2017</a:t>
             </a:fld>
             <a:endParaRPr lang="en-US"/>
           </a:p>
@@ -5516,7 +5524,7 @@
           <a:p>
             <a:fld id="{545C1171-4E79-4D59-8F00-AAF31F85EA49}" type="datetimeFigureOut">
               <a:rPr lang="en-US" smtClean="0"/>
-              <a:t>2/16/2017</a:t>
+              <a:t>2/17/2017</a:t>
             </a:fld>
             <a:endParaRPr lang="en-US"/>
           </a:p>
@@ -5760,7 +5768,7 @@
           <a:p>
             <a:fld id="{545C1171-4E79-4D59-8F00-AAF31F85EA49}" type="datetimeFigureOut">
               <a:rPr lang="en-US" smtClean="0"/>
-              <a:t>2/16/2017</a:t>
+              <a:t>2/17/2017</a:t>
             </a:fld>
             <a:endParaRPr lang="en-US"/>
           </a:p>
@@ -6741,32 +6749,94 @@
         </p:nvSpPr>
         <p:spPr/>
         <p:txBody>
+          <a:bodyPr>
+            <a:normAutofit/>
+          </a:bodyPr>
+          <a:lstStyle/>
+          <a:p>
+            <a:r>
+              <a:rPr lang="en-US" dirty="0"/>
+              <a:t>Environment Set Up - </a:t>
+            </a:r>
+            <a:r>
+              <a:rPr lang="en-US" sz="2700" dirty="0"/>
+              <a:t>Dan</a:t>
+            </a:r>
+          </a:p>
+        </p:txBody>
+      </p:sp>
+      <p:sp>
+        <p:nvSpPr>
+          <p:cNvPr id="3" name="Content Placeholder 2"/>
+          <p:cNvSpPr>
+            <a:spLocks noGrp="1"/>
+          </p:cNvSpPr>
+          <p:nvPr>
+            <p:ph idx="1"/>
+          </p:nvPr>
+        </p:nvSpPr>
+        <p:spPr/>
+        <p:txBody>
           <a:bodyPr/>
           <a:lstStyle/>
           <a:p>
+            <a:pPr lvl="1"/>
             <a:r>
               <a:rPr lang="en-US" dirty="0"/>
-              <a:t>Dan</a:t>
-            </a:r>
-          </a:p>
-        </p:txBody>
-      </p:sp>
-      <p:sp>
-        <p:nvSpPr>
-          <p:cNvPr id="3" name="Content Placeholder 2"/>
-          <p:cNvSpPr>
-            <a:spLocks noGrp="1"/>
-          </p:cNvSpPr>
-          <p:nvPr>
-            <p:ph idx="1"/>
-          </p:nvPr>
-        </p:nvSpPr>
-        <p:spPr/>
-        <p:txBody>
-          <a:bodyPr/>
-          <a:lstStyle/>
-          <a:p>
-            <a:endParaRPr lang="en-US"/>
+              <a:t>Computers to talking to each other directly over Ethernet.</a:t>
+            </a:r>
+          </a:p>
+          <a:p>
+            <a:pPr lvl="1"/>
+            <a:r>
+              <a:rPr lang="en-US" dirty="0"/>
+              <a:t>Autopilot (</a:t>
+            </a:r>
+            <a:r>
+              <a:rPr lang="en-US" dirty="0" err="1"/>
+              <a:t>Rasberry</a:t>
+            </a:r>
+            <a:r>
+              <a:rPr lang="en-US" dirty="0"/>
+              <a:t> Pi 3 (RPi3) and </a:t>
+            </a:r>
+            <a:r>
+              <a:rPr lang="en-US" dirty="0" err="1"/>
+              <a:t>PXFmini</a:t>
+            </a:r>
+            <a:r>
+              <a:rPr lang="en-US" dirty="0"/>
+              <a:t>) talking with other computers.</a:t>
+            </a:r>
+          </a:p>
+          <a:p>
+            <a:pPr lvl="1"/>
+            <a:r>
+              <a:rPr lang="en-US" dirty="0"/>
+              <a:t>ROS publisher/subscriber functionality.</a:t>
+            </a:r>
+          </a:p>
+          <a:p>
+            <a:pPr lvl="1"/>
+            <a:r>
+              <a:rPr lang="en-US" dirty="0" err="1"/>
+              <a:t>PXFmini</a:t>
+            </a:r>
+            <a:r>
+              <a:rPr lang="en-US" dirty="0"/>
+              <a:t> launched and armed!</a:t>
+            </a:r>
+          </a:p>
+          <a:p>
+            <a:pPr lvl="1"/>
+            <a:r>
+              <a:rPr lang="en-US" dirty="0"/>
+              <a:t>RPi3 connected to the internet.</a:t>
+            </a:r>
+          </a:p>
+          <a:p>
+            <a:pPr lvl="1"/>
+            <a:endParaRPr lang="en-US" dirty="0"/>
           </a:p>
         </p:txBody>
       </p:sp>
@@ -6784,6 +6854,565 @@
 </file>
 
 <file path=ppt/slides/slide11.xml><?xml version="1.0" encoding="utf-8"?>
+<p:sld xmlns:a="http://schemas.openxmlformats.org/drawingml/2006/main" xmlns:r="http://schemas.openxmlformats.org/officeDocument/2006/relationships" xmlns:p="http://schemas.openxmlformats.org/presentationml/2006/main">
+  <p:cSld>
+    <p:spTree>
+      <p:nvGrpSpPr>
+        <p:cNvPr id="1" name=""/>
+        <p:cNvGrpSpPr/>
+        <p:nvPr/>
+      </p:nvGrpSpPr>
+      <p:grpSpPr>
+        <a:xfrm>
+          <a:off x="0" y="0"/>
+          <a:ext cx="0" cy="0"/>
+          <a:chOff x="0" y="0"/>
+          <a:chExt cx="0" cy="0"/>
+        </a:xfrm>
+      </p:grpSpPr>
+      <p:sp>
+        <p:nvSpPr>
+          <p:cNvPr id="2" name="Title 1"/>
+          <p:cNvSpPr>
+            <a:spLocks noGrp="1"/>
+          </p:cNvSpPr>
+          <p:nvPr>
+            <p:ph type="title"/>
+          </p:nvPr>
+        </p:nvSpPr>
+        <p:spPr/>
+        <p:txBody>
+          <a:bodyPr/>
+          <a:lstStyle/>
+          <a:p>
+            <a:r>
+              <a:rPr lang="en-US" dirty="0"/>
+              <a:t>ROS publishing/subscribing - </a:t>
+            </a:r>
+            <a:r>
+              <a:rPr lang="en-US" sz="2400" dirty="0"/>
+              <a:t>Dan</a:t>
+            </a:r>
+          </a:p>
+        </p:txBody>
+      </p:sp>
+      <p:sp>
+        <p:nvSpPr>
+          <p:cNvPr id="3" name="Content Placeholder 2"/>
+          <p:cNvSpPr>
+            <a:spLocks noGrp="1"/>
+          </p:cNvSpPr>
+          <p:nvPr>
+            <p:ph idx="1"/>
+          </p:nvPr>
+        </p:nvSpPr>
+        <p:spPr/>
+        <p:txBody>
+          <a:bodyPr/>
+          <a:lstStyle/>
+          <a:p>
+            <a:pPr>
+              <a:buFont typeface="Arial" panose="020B0604020202020204" pitchFamily="34" charset="0"/>
+              <a:buChar char="•"/>
+            </a:pPr>
+            <a:r>
+              <a:rPr lang="en-US" dirty="0"/>
+              <a:t>Ran python script publishing to a ROS topic.</a:t>
+            </a:r>
+          </a:p>
+          <a:p>
+            <a:pPr>
+              <a:buFont typeface="Arial" panose="020B0604020202020204" pitchFamily="34" charset="0"/>
+              <a:buChar char="•"/>
+            </a:pPr>
+            <a:r>
+              <a:rPr lang="en-US" dirty="0"/>
+              <a:t>Command line execution publishing and subscribing to ROS topics. ROS publisher/subscriber functionality.</a:t>
+            </a:r>
+          </a:p>
+          <a:p>
+            <a:pPr>
+              <a:buFont typeface="Arial" panose="020B0604020202020204" pitchFamily="34" charset="0"/>
+              <a:buChar char="•"/>
+            </a:pPr>
+            <a:r>
+              <a:rPr lang="en-US" dirty="0"/>
+              <a:t>ROS publisher/subscriber functionality.</a:t>
+            </a:r>
+          </a:p>
+          <a:p>
+            <a:pPr>
+              <a:buFont typeface="Arial" panose="020B0604020202020204" pitchFamily="34" charset="0"/>
+              <a:buChar char="•"/>
+            </a:pPr>
+            <a:endParaRPr lang="en-US" dirty="0"/>
+          </a:p>
+        </p:txBody>
+      </p:sp>
+    </p:spTree>
+    <p:extLst>
+      <p:ext uri="{BB962C8B-B14F-4D97-AF65-F5344CB8AC3E}">
+        <p14:creationId xmlns:p14="http://schemas.microsoft.com/office/powerpoint/2010/main" val="1519649370"/>
+      </p:ext>
+    </p:extLst>
+  </p:cSld>
+  <p:clrMapOvr>
+    <a:masterClrMapping/>
+  </p:clrMapOvr>
+</p:sld>
+</file>
+
+<file path=ppt/slides/slide12.xml><?xml version="1.0" encoding="utf-8"?>
+<p:sld xmlns:a="http://schemas.openxmlformats.org/drawingml/2006/main" xmlns:r="http://schemas.openxmlformats.org/officeDocument/2006/relationships" xmlns:p="http://schemas.openxmlformats.org/presentationml/2006/main">
+  <p:cSld>
+    <p:spTree>
+      <p:nvGrpSpPr>
+        <p:cNvPr id="1" name=""/>
+        <p:cNvGrpSpPr/>
+        <p:nvPr/>
+      </p:nvGrpSpPr>
+      <p:grpSpPr>
+        <a:xfrm>
+          <a:off x="0" y="0"/>
+          <a:ext cx="0" cy="0"/>
+          <a:chOff x="0" y="0"/>
+          <a:chExt cx="0" cy="0"/>
+        </a:xfrm>
+      </p:grpSpPr>
+      <p:sp>
+        <p:nvSpPr>
+          <p:cNvPr id="2" name="Title 1"/>
+          <p:cNvSpPr>
+            <a:spLocks noGrp="1"/>
+          </p:cNvSpPr>
+          <p:nvPr>
+            <p:ph type="title"/>
+          </p:nvPr>
+        </p:nvSpPr>
+        <p:spPr/>
+        <p:txBody>
+          <a:bodyPr/>
+          <a:lstStyle/>
+          <a:p>
+            <a:r>
+              <a:rPr lang="en-US" dirty="0" err="1"/>
+              <a:t>AutoPilot</a:t>
+            </a:r>
+            <a:r>
+              <a:rPr lang="en-US" dirty="0"/>
+              <a:t> (</a:t>
+            </a:r>
+            <a:r>
+              <a:rPr lang="en-US" dirty="0" err="1"/>
+              <a:t>PXFmini</a:t>
+            </a:r>
+            <a:r>
+              <a:rPr lang="en-US" dirty="0"/>
+              <a:t>)- </a:t>
+            </a:r>
+            <a:r>
+              <a:rPr lang="en-US" sz="2400" dirty="0"/>
+              <a:t>Dan</a:t>
+            </a:r>
+          </a:p>
+        </p:txBody>
+      </p:sp>
+      <p:sp>
+        <p:nvSpPr>
+          <p:cNvPr id="3" name="Content Placeholder 2"/>
+          <p:cNvSpPr>
+            <a:spLocks noGrp="1"/>
+          </p:cNvSpPr>
+          <p:nvPr>
+            <p:ph idx="1"/>
+          </p:nvPr>
+        </p:nvSpPr>
+        <p:spPr/>
+        <p:txBody>
+          <a:bodyPr/>
+          <a:lstStyle/>
+          <a:p>
+            <a:pPr>
+              <a:buFont typeface="Arial" panose="020B0604020202020204" pitchFamily="34" charset="0"/>
+              <a:buChar char="•"/>
+            </a:pPr>
+            <a:r>
+              <a:rPr lang="en-US" dirty="0"/>
+              <a:t>Installed Erle image for Raspberry Pi 3</a:t>
+            </a:r>
+          </a:p>
+          <a:p>
+            <a:pPr lvl="1">
+              <a:buFont typeface="Arial" panose="020B0604020202020204" pitchFamily="34" charset="0"/>
+              <a:buChar char="•"/>
+            </a:pPr>
+            <a:r>
+              <a:rPr lang="en-US" dirty="0"/>
+              <a:t>Delayed due to manufacturer.</a:t>
+            </a:r>
+          </a:p>
+          <a:p>
+            <a:pPr lvl="1">
+              <a:buFont typeface="Arial" panose="020B0604020202020204" pitchFamily="34" charset="0"/>
+              <a:buChar char="•"/>
+            </a:pPr>
+            <a:r>
+              <a:rPr lang="en-US" dirty="0"/>
+              <a:t>First image was corrupted.</a:t>
+            </a:r>
+          </a:p>
+          <a:p>
+            <a:pPr lvl="1">
+              <a:buFont typeface="Arial" panose="020B0604020202020204" pitchFamily="34" charset="0"/>
+              <a:buChar char="•"/>
+            </a:pPr>
+            <a:r>
+              <a:rPr lang="en-US" dirty="0"/>
+              <a:t>Took several attempts to correctly install.</a:t>
+            </a:r>
+          </a:p>
+          <a:p>
+            <a:pPr marL="457200" lvl="1" indent="0">
+              <a:buNone/>
+            </a:pPr>
+            <a:endParaRPr lang="en-US" dirty="0"/>
+          </a:p>
+          <a:p>
+            <a:pPr>
+              <a:buFont typeface="Arial" panose="020B0604020202020204" pitchFamily="34" charset="0"/>
+              <a:buChar char="•"/>
+            </a:pPr>
+            <a:endParaRPr lang="en-US" dirty="0"/>
+          </a:p>
+        </p:txBody>
+      </p:sp>
+    </p:spTree>
+    <p:extLst>
+      <p:ext uri="{BB962C8B-B14F-4D97-AF65-F5344CB8AC3E}">
+        <p14:creationId xmlns:p14="http://schemas.microsoft.com/office/powerpoint/2010/main" val="1047580933"/>
+      </p:ext>
+    </p:extLst>
+  </p:cSld>
+  <p:clrMapOvr>
+    <a:masterClrMapping/>
+  </p:clrMapOvr>
+</p:sld>
+</file>
+
+<file path=ppt/slides/slide13.xml><?xml version="1.0" encoding="utf-8"?>
+<p:sld xmlns:a="http://schemas.openxmlformats.org/drawingml/2006/main" xmlns:r="http://schemas.openxmlformats.org/officeDocument/2006/relationships" xmlns:p="http://schemas.openxmlformats.org/presentationml/2006/main">
+  <p:cSld>
+    <p:spTree>
+      <p:nvGrpSpPr>
+        <p:cNvPr id="1" name=""/>
+        <p:cNvGrpSpPr/>
+        <p:nvPr/>
+      </p:nvGrpSpPr>
+      <p:grpSpPr>
+        <a:xfrm>
+          <a:off x="0" y="0"/>
+          <a:ext cx="0" cy="0"/>
+          <a:chOff x="0" y="0"/>
+          <a:chExt cx="0" cy="0"/>
+        </a:xfrm>
+      </p:grpSpPr>
+      <p:sp>
+        <p:nvSpPr>
+          <p:cNvPr id="2" name="Title 1"/>
+          <p:cNvSpPr>
+            <a:spLocks noGrp="1"/>
+          </p:cNvSpPr>
+          <p:nvPr>
+            <p:ph type="title"/>
+          </p:nvPr>
+        </p:nvSpPr>
+        <p:spPr/>
+        <p:txBody>
+          <a:bodyPr/>
+          <a:lstStyle/>
+          <a:p>
+            <a:r>
+              <a:rPr lang="en-US" dirty="0" err="1"/>
+              <a:t>AutoPilot</a:t>
+            </a:r>
+            <a:r>
+              <a:rPr lang="en-US" dirty="0"/>
+              <a:t> (</a:t>
+            </a:r>
+            <a:r>
+              <a:rPr lang="en-US" dirty="0" err="1"/>
+              <a:t>PXFmini</a:t>
+            </a:r>
+            <a:r>
+              <a:rPr lang="en-US" dirty="0"/>
+              <a:t>)- </a:t>
+            </a:r>
+            <a:r>
+              <a:rPr lang="en-US" sz="2400" dirty="0"/>
+              <a:t>Dan</a:t>
+            </a:r>
+          </a:p>
+        </p:txBody>
+      </p:sp>
+      <p:sp>
+        <p:nvSpPr>
+          <p:cNvPr id="3" name="Content Placeholder 2"/>
+          <p:cNvSpPr>
+            <a:spLocks noGrp="1"/>
+          </p:cNvSpPr>
+          <p:nvPr>
+            <p:ph idx="1"/>
+          </p:nvPr>
+        </p:nvSpPr>
+        <p:spPr/>
+        <p:txBody>
+          <a:bodyPr/>
+          <a:lstStyle/>
+          <a:p>
+            <a:pPr>
+              <a:buFont typeface="Arial" panose="020B0604020202020204" pitchFamily="34" charset="0"/>
+              <a:buChar char="•"/>
+            </a:pPr>
+            <a:r>
+              <a:rPr lang="en-US" dirty="0"/>
+              <a:t>Launches and Arms!</a:t>
+            </a:r>
+          </a:p>
+          <a:p>
+            <a:pPr>
+              <a:buFont typeface="Arial" panose="020B0604020202020204" pitchFamily="34" charset="0"/>
+              <a:buChar char="•"/>
+            </a:pPr>
+            <a:r>
+              <a:rPr lang="en-US" dirty="0"/>
+              <a:t>Sends IMU data.</a:t>
+            </a:r>
+          </a:p>
+          <a:p>
+            <a:pPr>
+              <a:buFont typeface="Arial" panose="020B0604020202020204" pitchFamily="34" charset="0"/>
+              <a:buChar char="•"/>
+            </a:pPr>
+            <a:r>
+              <a:rPr lang="en-US" dirty="0"/>
+              <a:t>Still need to get motors working.</a:t>
+            </a:r>
+          </a:p>
+          <a:p>
+            <a:pPr>
+              <a:buFont typeface="Arial" panose="020B0604020202020204" pitchFamily="34" charset="0"/>
+              <a:buChar char="•"/>
+            </a:pPr>
+            <a:endParaRPr lang="en-US" dirty="0"/>
+          </a:p>
+        </p:txBody>
+      </p:sp>
+    </p:spTree>
+    <p:extLst>
+      <p:ext uri="{BB962C8B-B14F-4D97-AF65-F5344CB8AC3E}">
+        <p14:creationId xmlns:p14="http://schemas.microsoft.com/office/powerpoint/2010/main" val="594429516"/>
+      </p:ext>
+    </p:extLst>
+  </p:cSld>
+  <p:clrMapOvr>
+    <a:masterClrMapping/>
+  </p:clrMapOvr>
+</p:sld>
+</file>
+
+<file path=ppt/slides/slide14.xml><?xml version="1.0" encoding="utf-8"?>
+<p:sld xmlns:a="http://schemas.openxmlformats.org/drawingml/2006/main" xmlns:r="http://schemas.openxmlformats.org/officeDocument/2006/relationships" xmlns:p="http://schemas.openxmlformats.org/presentationml/2006/main">
+  <p:cSld>
+    <p:spTree>
+      <p:nvGrpSpPr>
+        <p:cNvPr id="1" name=""/>
+        <p:cNvGrpSpPr/>
+        <p:nvPr/>
+      </p:nvGrpSpPr>
+      <p:grpSpPr>
+        <a:xfrm>
+          <a:off x="0" y="0"/>
+          <a:ext cx="0" cy="0"/>
+          <a:chOff x="0" y="0"/>
+          <a:chExt cx="0" cy="0"/>
+        </a:xfrm>
+      </p:grpSpPr>
+      <p:sp>
+        <p:nvSpPr>
+          <p:cNvPr id="2" name="Title 1"/>
+          <p:cNvSpPr>
+            <a:spLocks noGrp="1"/>
+          </p:cNvSpPr>
+          <p:nvPr>
+            <p:ph type="title"/>
+          </p:nvPr>
+        </p:nvSpPr>
+        <p:spPr/>
+        <p:txBody>
+          <a:bodyPr/>
+          <a:lstStyle/>
+          <a:p>
+            <a:r>
+              <a:rPr lang="en-US" dirty="0"/>
+              <a:t>What’s Next?- </a:t>
+            </a:r>
+            <a:r>
+              <a:rPr lang="en-US" sz="2400" dirty="0"/>
+              <a:t>Dan</a:t>
+            </a:r>
+          </a:p>
+        </p:txBody>
+      </p:sp>
+      <p:sp>
+        <p:nvSpPr>
+          <p:cNvPr id="3" name="Content Placeholder 2"/>
+          <p:cNvSpPr>
+            <a:spLocks noGrp="1"/>
+          </p:cNvSpPr>
+          <p:nvPr>
+            <p:ph idx="1"/>
+          </p:nvPr>
+        </p:nvSpPr>
+        <p:spPr/>
+        <p:txBody>
+          <a:bodyPr>
+            <a:normAutofit fontScale="85000" lnSpcReduction="10000"/>
+          </a:bodyPr>
+          <a:lstStyle/>
+          <a:p>
+            <a:pPr>
+              <a:buFont typeface="Arial" panose="020B0604020202020204" pitchFamily="34" charset="0"/>
+              <a:buChar char="•"/>
+            </a:pPr>
+            <a:r>
+              <a:rPr lang="en-US" dirty="0"/>
+              <a:t>Now that our environment is nearly set up, I will start focusing on:</a:t>
+            </a:r>
+          </a:p>
+          <a:p>
+            <a:pPr lvl="1">
+              <a:buFont typeface="Arial" panose="020B0604020202020204" pitchFamily="34" charset="0"/>
+              <a:buChar char="•"/>
+            </a:pPr>
+            <a:r>
+              <a:rPr lang="en-US" dirty="0"/>
+              <a:t>Image analysis</a:t>
+            </a:r>
+          </a:p>
+          <a:p>
+            <a:pPr lvl="2">
+              <a:buFont typeface="Arial" panose="020B0604020202020204" pitchFamily="34" charset="0"/>
+              <a:buChar char="•"/>
+            </a:pPr>
+            <a:r>
+              <a:rPr lang="en-US" dirty="0"/>
+              <a:t>Use the information from Tao’s simulation work to start testing our environment mapping module.</a:t>
+            </a:r>
+          </a:p>
+          <a:p>
+            <a:pPr lvl="1">
+              <a:buFont typeface="Arial" panose="020B0604020202020204" pitchFamily="34" charset="0"/>
+              <a:buChar char="•"/>
+            </a:pPr>
+            <a:r>
+              <a:rPr lang="en-US" dirty="0"/>
+              <a:t>Radio Communication</a:t>
+            </a:r>
+          </a:p>
+          <a:p>
+            <a:pPr lvl="2">
+              <a:buFont typeface="Arial" panose="020B0604020202020204" pitchFamily="34" charset="0"/>
+              <a:buChar char="•"/>
+            </a:pPr>
+            <a:r>
+              <a:rPr lang="en-US" dirty="0"/>
+              <a:t>Transmit telemetry to our GCS and send commands to the RPi3</a:t>
+            </a:r>
+          </a:p>
+          <a:p>
+            <a:pPr lvl="1">
+              <a:buFont typeface="Arial" panose="020B0604020202020204" pitchFamily="34" charset="0"/>
+              <a:buChar char="•"/>
+            </a:pPr>
+            <a:r>
+              <a:rPr lang="en-US" dirty="0"/>
+              <a:t>User Interface</a:t>
+            </a:r>
+          </a:p>
+          <a:p>
+            <a:pPr lvl="2">
+              <a:buFont typeface="Arial" panose="020B0604020202020204" pitchFamily="34" charset="0"/>
+              <a:buChar char="•"/>
+            </a:pPr>
+            <a:r>
+              <a:rPr lang="en-US" dirty="0"/>
+              <a:t>Install a GUI for vehicle control (</a:t>
+            </a:r>
+            <a:r>
+              <a:rPr lang="en-US" dirty="0" err="1"/>
+              <a:t>ArduPilot</a:t>
+            </a:r>
+            <a:r>
+              <a:rPr lang="en-US" dirty="0"/>
+              <a:t>/</a:t>
+            </a:r>
+            <a:r>
+              <a:rPr lang="en-US" dirty="0" err="1"/>
+              <a:t>QGroundControl</a:t>
+            </a:r>
+            <a:r>
+              <a:rPr lang="en-US" dirty="0"/>
+              <a:t>) on the GCS.</a:t>
+            </a:r>
+          </a:p>
+          <a:p>
+            <a:pPr lvl="2">
+              <a:buFont typeface="Arial" panose="020B0604020202020204" pitchFamily="34" charset="0"/>
+              <a:buChar char="•"/>
+            </a:pPr>
+            <a:r>
+              <a:rPr lang="en-US" dirty="0"/>
+              <a:t>Create custom python scripts for commands we will need to execute on a CLI.</a:t>
+            </a:r>
+          </a:p>
+          <a:p>
+            <a:pPr lvl="1">
+              <a:buFont typeface="Arial" panose="020B0604020202020204" pitchFamily="34" charset="0"/>
+              <a:buChar char="•"/>
+            </a:pPr>
+            <a:r>
+              <a:rPr lang="en-US" dirty="0"/>
+              <a:t>Integrate all of the above to work toward autonomous </a:t>
+            </a:r>
+            <a:r>
+              <a:rPr lang="en-US"/>
+              <a:t>RC navigation.</a:t>
+            </a:r>
+            <a:endParaRPr lang="en-US" dirty="0"/>
+          </a:p>
+          <a:p>
+            <a:pPr>
+              <a:buFont typeface="Arial" panose="020B0604020202020204" pitchFamily="34" charset="0"/>
+              <a:buChar char="•"/>
+            </a:pPr>
+            <a:endParaRPr lang="en-US" dirty="0"/>
+          </a:p>
+        </p:txBody>
+      </p:sp>
+    </p:spTree>
+    <p:extLst>
+      <p:ext uri="{BB962C8B-B14F-4D97-AF65-F5344CB8AC3E}">
+        <p14:creationId xmlns:p14="http://schemas.microsoft.com/office/powerpoint/2010/main" val="4278058921"/>
+      </p:ext>
+    </p:extLst>
+  </p:cSld>
+  <p:clrMapOvr>
+    <a:masterClrMapping/>
+  </p:clrMapOvr>
+</p:sld>
+</file>
+
+<file path=ppt/slides/slide15.xml><?xml version="1.0" encoding="utf-8"?>
 <p:sld xmlns:a="http://schemas.openxmlformats.org/drawingml/2006/main" xmlns:r="http://schemas.openxmlformats.org/officeDocument/2006/relationships" xmlns:p="http://schemas.openxmlformats.org/presentationml/2006/main">
   <p:cSld>
     <p:spTree>

</xml_diff>